<commit_message>
Fix description of the "groups" command
</commit_message>
<xml_diff>
--- a/presentation/Bash.pptx
+++ b/presentation/Bash.pptx
@@ -339,7 +339,7 @@
                   <a:schemeClr val="tx2"/>
                 </a:solidFill>
               </a:rPr>
-              <a:t>20.02.2020</a:t>
+              <a:t>10.02.2021</a:t>
             </a:fld>
             <a:endParaRPr lang="de-DE">
               <a:solidFill>
@@ -689,7 +689,7 @@
             <a:fld id="{B4113CCE-1A1A-46DB-884A-AE560F65C3AF}" type="datetimeFigureOut">
               <a:rPr lang="de-DE" smtClean="0"/>
               <a:pPr/>
-              <a:t>20.02.2020</a:t>
+              <a:t>10.02.2021</a:t>
             </a:fld>
             <a:endParaRPr lang="de-DE"/>
           </a:p>
@@ -15122,7 +15122,7 @@
           <a:p>
             <a:fld id="{366C6F3F-2459-4D70-9926-FB42BF728FA6}" type="datetime1">
               <a:rPr lang="de-DE" smtClean="0"/>
-              <a:t>20.02.2020</a:t>
+              <a:t>10.02.2021</a:t>
             </a:fld>
             <a:endParaRPr lang="de-DE"/>
           </a:p>
@@ -15246,7 +15246,7 @@
           <a:p>
             <a:fld id="{8EB94C85-1664-4A48-98AC-8DF753D25A29}" type="datetime1">
               <a:rPr lang="de-DE" smtClean="0"/>
-              <a:t>20.02.2020</a:t>
+              <a:t>10.02.2021</a:t>
             </a:fld>
             <a:endParaRPr lang="de-DE"/>
           </a:p>
@@ -15379,7 +15379,7 @@
           <a:p>
             <a:fld id="{691FC979-3F94-4691-BC89-32D13FC7EBCE}" type="datetime1">
               <a:rPr lang="de-DE" smtClean="0"/>
-              <a:t>20.02.2020</a:t>
+              <a:t>10.02.2021</a:t>
             </a:fld>
             <a:endParaRPr lang="de-DE"/>
           </a:p>
@@ -15747,7 +15747,7 @@
           <a:p>
             <a:fld id="{CBC55DA8-7BFB-46FD-BBA5-A6DF63369D11}" type="datetime1">
               <a:rPr lang="de-DE" smtClean="0"/>
-              <a:t>20.02.2020</a:t>
+              <a:t>10.02.2021</a:t>
             </a:fld>
             <a:endParaRPr lang="de-DE"/>
           </a:p>
@@ -15928,7 +15928,7 @@
           <a:p>
             <a:fld id="{08AC7274-303B-40A0-A9B4-04FCC19861B5}" type="datetime1">
               <a:rPr lang="de-DE" smtClean="0"/>
-              <a:t>20.02.2020</a:t>
+              <a:t>10.02.2021</a:t>
             </a:fld>
             <a:endParaRPr lang="de-DE"/>
           </a:p>
@@ -16048,7 +16048,7 @@
           <a:p>
             <a:fld id="{04273802-5659-48BC-9FAF-5DEA6D19D2B7}" type="datetime1">
               <a:rPr lang="de-DE" smtClean="0"/>
-              <a:t>20.02.2020</a:t>
+              <a:t>10.02.2021</a:t>
             </a:fld>
             <a:endParaRPr lang="de-DE"/>
           </a:p>
@@ -16146,7 +16146,7 @@
           <a:p>
             <a:fld id="{A879DCBB-93B0-44A3-BD1F-0C3535CA8699}" type="datetime1">
               <a:rPr lang="de-DE" smtClean="0"/>
-              <a:t>20.02.2020</a:t>
+              <a:t>10.02.2021</a:t>
             </a:fld>
             <a:endParaRPr lang="de-DE"/>
           </a:p>
@@ -16270,7 +16270,7 @@
           <a:p>
             <a:fld id="{D6ACE559-FDBB-41B1-8D4B-DC9AA86538CE}" type="datetime1">
               <a:rPr lang="de-DE" smtClean="0"/>
-              <a:t>20.02.2020</a:t>
+              <a:t>10.02.2021</a:t>
             </a:fld>
             <a:endParaRPr lang="de-DE"/>
           </a:p>
@@ -16418,7 +16418,7 @@
           <a:p>
             <a:fld id="{A17D5A13-5CB3-48F6-94E4-1D24B0CCAADA}" type="datetime1">
               <a:rPr lang="de-DE" smtClean="0"/>
-              <a:t>20.02.2020</a:t>
+              <a:t>10.02.2021</a:t>
             </a:fld>
             <a:endParaRPr lang="de-DE"/>
           </a:p>
@@ -16617,7 +16617,7 @@
           <a:p>
             <a:fld id="{7FDE578D-883C-4F1A-917B-4C2253C6F4AE}" type="datetime1">
               <a:rPr lang="de-DE" smtClean="0"/>
-              <a:t>20.02.2020</a:t>
+              <a:t>10.02.2021</a:t>
             </a:fld>
             <a:endParaRPr lang="de-DE"/>
           </a:p>
@@ -16816,7 +16816,7 @@
           <a:p>
             <a:fld id="{37592AC1-A45D-4C86-A646-7D7AA3CA8F0F}" type="datetime1">
               <a:rPr lang="de-DE" smtClean="0"/>
-              <a:t>20.02.2020</a:t>
+              <a:t>10.02.2021</a:t>
             </a:fld>
             <a:endParaRPr lang="de-DE"/>
           </a:p>
@@ -17231,7 +17231,7 @@
           <a:p>
             <a:fld id="{6EF8A41A-F013-46F9-A1B7-9C788DB16844}" type="datetime1">
               <a:rPr lang="de-DE" smtClean="0"/>
-              <a:t>20.02.2020</a:t>
+              <a:t>10.02.2021</a:t>
             </a:fld>
             <a:endParaRPr lang="de-DE" dirty="0"/>
           </a:p>
@@ -17806,7 +17806,7 @@
           <a:p>
             <a:fld id="{F6A23D30-8385-4740-BFA9-93717CB1115D}" type="datetime1">
               <a:rPr lang="de-DE" smtClean="0"/>
-              <a:t>20.02.2020</a:t>
+              <a:t>10.02.2021</a:t>
             </a:fld>
             <a:endParaRPr lang="de-DE" dirty="0"/>
           </a:p>
@@ -18442,7 +18442,7 @@
           <a:p>
             <a:fld id="{DEAE0D00-77B9-479C-AA25-1CC77788EEA5}" type="datetime1">
               <a:rPr lang="de-DE" smtClean="0"/>
-              <a:t>20.02.2020</a:t>
+              <a:t>10.02.2021</a:t>
             </a:fld>
             <a:endParaRPr lang="de-DE"/>
           </a:p>
@@ -18540,7 +18540,7 @@
           <a:p>
             <a:fld id="{691FC979-3F94-4691-BC89-32D13FC7EBCE}" type="datetime1">
               <a:rPr lang="de-DE" smtClean="0"/>
-              <a:t>20.02.2020</a:t>
+              <a:t>10.02.2021</a:t>
             </a:fld>
             <a:endParaRPr lang="de-DE"/>
           </a:p>
@@ -18767,7 +18767,7 @@
           <a:p>
             <a:fld id="{691FC979-3F94-4691-BC89-32D13FC7EBCE}" type="datetime1">
               <a:rPr lang="de-DE" smtClean="0"/>
-              <a:t>20.02.2020</a:t>
+              <a:t>10.02.2021</a:t>
             </a:fld>
             <a:endParaRPr lang="de-DE"/>
           </a:p>
@@ -18957,7 +18957,7 @@
           <a:p>
             <a:fld id="{691FC979-3F94-4691-BC89-32D13FC7EBCE}" type="datetime1">
               <a:rPr lang="de-DE" smtClean="0"/>
-              <a:t>20.02.2020</a:t>
+              <a:t>10.02.2021</a:t>
             </a:fld>
             <a:endParaRPr lang="de-DE"/>
           </a:p>
@@ -19145,7 +19145,7 @@
           <a:p>
             <a:fld id="{691FC979-3F94-4691-BC89-32D13FC7EBCE}" type="datetime1">
               <a:rPr lang="de-DE" smtClean="0"/>
-              <a:t>20.02.2020</a:t>
+              <a:t>10.02.2021</a:t>
             </a:fld>
             <a:endParaRPr lang="de-DE"/>
           </a:p>
@@ -19487,7 +19487,7 @@
           <a:p>
             <a:fld id="{691FC979-3F94-4691-BC89-32D13FC7EBCE}" type="datetime1">
               <a:rPr lang="de-DE" smtClean="0"/>
-              <a:t>20.02.2020</a:t>
+              <a:t>10.02.2021</a:t>
             </a:fld>
             <a:endParaRPr lang="de-DE"/>
           </a:p>
@@ -19765,7 +19765,7 @@
           <a:p>
             <a:fld id="{691FC979-3F94-4691-BC89-32D13FC7EBCE}" type="datetime1">
               <a:rPr lang="de-DE" smtClean="0"/>
-              <a:t>20.02.2020</a:t>
+              <a:t>10.02.2021</a:t>
             </a:fld>
             <a:endParaRPr lang="de-DE"/>
           </a:p>
@@ -20108,7 +20108,7 @@
           <a:p>
             <a:fld id="{CBC55DA8-7BFB-46FD-BBA5-A6DF63369D11}" type="datetime1">
               <a:rPr lang="de-DE" smtClean="0"/>
-              <a:t>20.02.2020</a:t>
+              <a:t>10.02.2021</a:t>
             </a:fld>
             <a:endParaRPr lang="de-DE"/>
           </a:p>
@@ -20425,7 +20425,7 @@
           <a:p>
             <a:fld id="{CBC55DA8-7BFB-46FD-BBA5-A6DF63369D11}" type="datetime1">
               <a:rPr lang="de-DE" smtClean="0"/>
-              <a:t>20.02.2020</a:t>
+              <a:t>10.02.2021</a:t>
             </a:fld>
             <a:endParaRPr lang="de-DE"/>
           </a:p>
@@ -20523,7 +20523,7 @@
           <a:p>
             <a:fld id="{CBC55DA8-7BFB-46FD-BBA5-A6DF63369D11}" type="datetime1">
               <a:rPr lang="de-DE" smtClean="0"/>
-              <a:t>20.02.2020</a:t>
+              <a:t>10.02.2021</a:t>
             </a:fld>
             <a:endParaRPr lang="de-DE"/>
           </a:p>
@@ -21022,7 +21022,7 @@
           <a:p>
             <a:r>
               <a:rPr lang="de-DE" dirty="0"/>
-              <a:t>Gruppen auflisten: </a:t>
+              <a:t>Zugehörigkeit des aktuellen Users zu Gruppen: </a:t>
             </a:r>
             <a:r>
               <a:rPr lang="de-DE" sz="2400" dirty="0" err="1">
@@ -21273,7 +21273,7 @@
           <a:p>
             <a:fld id="{691FC979-3F94-4691-BC89-32D13FC7EBCE}" type="datetime1">
               <a:rPr lang="de-DE" smtClean="0"/>
-              <a:t>20.02.2020</a:t>
+              <a:t>10.02.2021</a:t>
             </a:fld>
             <a:endParaRPr lang="de-DE"/>
           </a:p>
@@ -21460,7 +21460,7 @@
           <a:p>
             <a:fld id="{7CAB622F-8E15-4AA7-B23D-2D3C823960FD}" type="datetime1">
               <a:rPr lang="de-DE" smtClean="0"/>
-              <a:t>20.02.2020</a:t>
+              <a:t>10.02.2021</a:t>
             </a:fld>
             <a:endParaRPr lang="de-DE"/>
           </a:p>
@@ -21558,7 +21558,7 @@
           <a:p>
             <a:fld id="{08AC7274-303B-40A0-A9B4-04FCC19861B5}" type="datetime1">
               <a:rPr lang="de-DE" smtClean="0"/>
-              <a:t>20.02.2020</a:t>
+              <a:t>10.02.2021</a:t>
             </a:fld>
             <a:endParaRPr lang="de-DE"/>
           </a:p>
@@ -21919,7 +21919,7 @@
           <a:p>
             <a:fld id="{691FC979-3F94-4691-BC89-32D13FC7EBCE}" type="datetime1">
               <a:rPr lang="de-DE" smtClean="0"/>
-              <a:t>20.02.2020</a:t>
+              <a:t>10.02.2021</a:t>
             </a:fld>
             <a:endParaRPr lang="de-DE"/>
           </a:p>
@@ -22360,7 +22360,7 @@
           <a:p>
             <a:fld id="{691FC979-3F94-4691-BC89-32D13FC7EBCE}" type="datetime1">
               <a:rPr lang="de-DE" smtClean="0"/>
-              <a:t>20.02.2020</a:t>
+              <a:t>10.02.2021</a:t>
             </a:fld>
             <a:endParaRPr lang="de-DE"/>
           </a:p>
@@ -22517,7 +22517,7 @@
           <a:p>
             <a:fld id="{08AC7274-303B-40A0-A9B4-04FCC19861B5}" type="datetime1">
               <a:rPr lang="de-DE" smtClean="0"/>
-              <a:t>20.02.2020</a:t>
+              <a:t>10.02.2021</a:t>
             </a:fld>
             <a:endParaRPr lang="de-DE"/>
           </a:p>
@@ -22797,7 +22797,7 @@
           <a:p>
             <a:fld id="{691FC979-3F94-4691-BC89-32D13FC7EBCE}" type="datetime1">
               <a:rPr lang="de-DE" smtClean="0"/>
-              <a:t>20.02.2020</a:t>
+              <a:t>10.02.2021</a:t>
             </a:fld>
             <a:endParaRPr lang="de-DE"/>
           </a:p>
@@ -23164,7 +23164,7 @@
           <a:p>
             <a:fld id="{691FC979-3F94-4691-BC89-32D13FC7EBCE}" type="datetime1">
               <a:rPr lang="de-DE" smtClean="0"/>
-              <a:t>20.02.2020</a:t>
+              <a:t>10.02.2021</a:t>
             </a:fld>
             <a:endParaRPr lang="de-DE"/>
           </a:p>
@@ -23383,7 +23383,7 @@
           <a:p>
             <a:fld id="{691FC979-3F94-4691-BC89-32D13FC7EBCE}" type="datetime1">
               <a:rPr lang="de-DE" smtClean="0"/>
-              <a:t>20.02.2020</a:t>
+              <a:t>10.02.2021</a:t>
             </a:fld>
             <a:endParaRPr lang="de-DE"/>
           </a:p>
@@ -23632,7 +23632,7 @@
           <a:p>
             <a:fld id="{691FC979-3F94-4691-BC89-32D13FC7EBCE}" type="datetime1">
               <a:rPr lang="de-DE" smtClean="0"/>
-              <a:t>20.02.2020</a:t>
+              <a:t>10.02.2021</a:t>
             </a:fld>
             <a:endParaRPr lang="de-DE"/>
           </a:p>
@@ -23841,7 +23841,7 @@
           <a:p>
             <a:fld id="{691FC979-3F94-4691-BC89-32D13FC7EBCE}" type="datetime1">
               <a:rPr lang="de-DE" smtClean="0"/>
-              <a:t>20.02.2020</a:t>
+              <a:t>10.02.2021</a:t>
             </a:fld>
             <a:endParaRPr lang="de-DE"/>
           </a:p>
@@ -24109,7 +24109,7 @@
           <a:p>
             <a:fld id="{691FC979-3F94-4691-BC89-32D13FC7EBCE}" type="datetime1">
               <a:rPr lang="de-DE" smtClean="0"/>
-              <a:t>20.02.2020</a:t>
+              <a:t>10.02.2021</a:t>
             </a:fld>
             <a:endParaRPr lang="de-DE"/>
           </a:p>
@@ -24500,7 +24500,7 @@
           <a:p>
             <a:fld id="{7CAB622F-8E15-4AA7-B23D-2D3C823960FD}" type="datetime1">
               <a:rPr lang="de-DE" smtClean="0"/>
-              <a:t>20.02.2020</a:t>
+              <a:t>10.02.2021</a:t>
             </a:fld>
             <a:endParaRPr lang="de-DE"/>
           </a:p>
@@ -24639,7 +24639,7 @@
           <a:p>
             <a:fld id="{691FC979-3F94-4691-BC89-32D13FC7EBCE}" type="datetime1">
               <a:rPr lang="de-DE" smtClean="0"/>
-              <a:t>20.02.2020</a:t>
+              <a:t>10.02.2021</a:t>
             </a:fld>
             <a:endParaRPr lang="de-DE"/>
           </a:p>
@@ -24809,7 +24809,7 @@
           <a:p>
             <a:fld id="{691FC979-3F94-4691-BC89-32D13FC7EBCE}" type="datetime1">
               <a:rPr lang="de-DE" smtClean="0"/>
-              <a:t>20.02.2020</a:t>
+              <a:t>10.02.2021</a:t>
             </a:fld>
             <a:endParaRPr lang="de-DE"/>
           </a:p>
@@ -25099,7 +25099,7 @@
           <a:p>
             <a:fld id="{691FC979-3F94-4691-BC89-32D13FC7EBCE}" type="datetime1">
               <a:rPr lang="de-DE" smtClean="0"/>
-              <a:t>20.02.2020</a:t>
+              <a:t>10.02.2021</a:t>
             </a:fld>
             <a:endParaRPr lang="de-DE"/>
           </a:p>
@@ -25549,7 +25549,7 @@
           <a:p>
             <a:fld id="{81CAA568-E4AD-43EC-8F2A-0AD1F2EE9220}" type="datetime1">
               <a:rPr lang="de-DE" smtClean="0"/>
-              <a:t>20.02.2020</a:t>
+              <a:t>10.02.2021</a:t>
             </a:fld>
             <a:endParaRPr lang="de-DE"/>
           </a:p>
@@ -25992,7 +25992,7 @@
           <a:p>
             <a:fld id="{81CAA568-E4AD-43EC-8F2A-0AD1F2EE9220}" type="datetime1">
               <a:rPr lang="de-DE" smtClean="0"/>
-              <a:t>20.02.2020</a:t>
+              <a:t>10.02.2021</a:t>
             </a:fld>
             <a:endParaRPr lang="de-DE"/>
           </a:p>
@@ -26250,7 +26250,7 @@
           <a:p>
             <a:fld id="{81CAA568-E4AD-43EC-8F2A-0AD1F2EE9220}" type="datetime1">
               <a:rPr lang="de-DE" smtClean="0"/>
-              <a:t>20.02.2020</a:t>
+              <a:t>10.02.2021</a:t>
             </a:fld>
             <a:endParaRPr lang="de-DE"/>
           </a:p>
@@ -26394,7 +26394,7 @@
           <a:p>
             <a:fld id="{81F9AF91-D5A7-4DFB-9749-E97FA4AADD5C}" type="datetime1">
               <a:rPr lang="de-DE" smtClean="0"/>
-              <a:t>20.02.2020</a:t>
+              <a:t>10.02.2021</a:t>
             </a:fld>
             <a:endParaRPr lang="de-DE"/>
           </a:p>
@@ -26602,7 +26602,7 @@
           <a:p>
             <a:fld id="{CC6A951E-FE58-4A7B-8560-55DE4235FB0A}" type="datetime1">
               <a:rPr lang="de-DE" smtClean="0"/>
-              <a:t>20.02.2020</a:t>
+              <a:t>10.02.2021</a:t>
             </a:fld>
             <a:endParaRPr lang="de-DE"/>
           </a:p>
@@ -26852,7 +26852,7 @@
           <a:p>
             <a:fld id="{CBC55DA8-7BFB-46FD-BBA5-A6DF63369D11}" type="datetime1">
               <a:rPr lang="de-DE" smtClean="0"/>
-              <a:t>20.02.2020</a:t>
+              <a:t>10.02.2021</a:t>
             </a:fld>
             <a:endParaRPr lang="de-DE"/>
           </a:p>
@@ -26950,7 +26950,7 @@
           <a:p>
             <a:fld id="{CBC55DA8-7BFB-46FD-BBA5-A6DF63369D11}" type="datetime1">
               <a:rPr lang="de-DE" smtClean="0"/>
-              <a:t>20.02.2020</a:t>
+              <a:t>10.02.2021</a:t>
             </a:fld>
             <a:endParaRPr lang="de-DE"/>
           </a:p>
@@ -27243,7 +27243,7 @@
           <a:p>
             <a:fld id="{CBC55DA8-7BFB-46FD-BBA5-A6DF63369D11}" type="datetime1">
               <a:rPr lang="de-DE" smtClean="0"/>
-              <a:t>20.02.2020</a:t>
+              <a:t>10.02.2021</a:t>
             </a:fld>
             <a:endParaRPr lang="de-DE"/>
           </a:p>
@@ -27541,7 +27541,7 @@
           <a:p>
             <a:fld id="{CBC55DA8-7BFB-46FD-BBA5-A6DF63369D11}" type="datetime1">
               <a:rPr lang="de-DE" smtClean="0"/>
-              <a:t>20.02.2020</a:t>
+              <a:t>10.02.2021</a:t>
             </a:fld>
             <a:endParaRPr lang="de-DE"/>
           </a:p>
@@ -27639,7 +27639,7 @@
           <a:p>
             <a:fld id="{CBC55DA8-7BFB-46FD-BBA5-A6DF63369D11}" type="datetime1">
               <a:rPr lang="de-DE" smtClean="0"/>
-              <a:t>20.02.2020</a:t>
+              <a:t>10.02.2021</a:t>
             </a:fld>
             <a:endParaRPr lang="de-DE"/>
           </a:p>

</xml_diff>